<commit_message>
20180227Tu - Timeline update according Natalie
</commit_message>
<xml_diff>
--- a/01_Resources/Timeline.pptx
+++ b/01_Resources/Timeline.pptx
@@ -5047,8 +5047,8 @@
         </p:nvSpPr>
         <p:spPr>
           <a:xfrm rot="5400000">
-            <a:off x="3379682" y="3941109"/>
-            <a:ext cx="4320000" cy="144000"/>
+            <a:off x="3433682" y="3982204"/>
+            <a:ext cx="4212000" cy="144000"/>
           </a:xfrm>
           <a:prstGeom prst="roundRect">
             <a:avLst/>
@@ -5374,7 +5374,7 @@
         <p:spPr>
           <a:xfrm>
             <a:off x="5643602" y="2236827"/>
-            <a:ext cx="4398531" cy="461665"/>
+            <a:ext cx="4398531" cy="646331"/>
           </a:xfrm>
           <a:prstGeom prst="rect">
             <a:avLst/>
@@ -5403,10 +5403,40 @@
               <a:rPr lang="en-GB" sz="1200" dirty="0" smtClean="0"/>
             </a:br>
             <a:r>
+              <a:rPr lang="en-GB" sz="1200" dirty="0" smtClean="0"/>
+              <a:t>1. </a:t>
+            </a:r>
+            <a:r>
               <a:rPr lang="en-GB" sz="1200" i="1" dirty="0" smtClean="0"/>
-              <a:t>Subject: Glossary Acceptance by the Working Group.</a:t>
-            </a:r>
-            <a:endParaRPr lang="en-GB" sz="1200" i="1" dirty="0"/>
+              <a:t>Glossary </a:t>
+            </a:r>
+            <a:r>
+              <a:rPr lang="en-GB" sz="1200" i="1" dirty="0"/>
+              <a:t>a</a:t>
+            </a:r>
+            <a:r>
+              <a:rPr lang="en-GB" sz="1200" i="1" dirty="0" smtClean="0"/>
+              <a:t>cceptance </a:t>
+            </a:r>
+            <a:r>
+              <a:rPr lang="en-GB" sz="1200" i="1" dirty="0" smtClean="0"/>
+              <a:t>by the Working Group</a:t>
+            </a:r>
+            <a:r>
+              <a:rPr lang="en-GB" sz="1200" i="1" dirty="0" smtClean="0"/>
+              <a:t>.</a:t>
+            </a:r>
+          </a:p>
+          <a:p>
+            <a:r>
+              <a:rPr lang="en-GB" sz="1200" dirty="0" smtClean="0"/>
+              <a:t>2. </a:t>
+            </a:r>
+            <a:r>
+              <a:rPr lang="en-GB" sz="1200" i="1" dirty="0" smtClean="0"/>
+              <a:t>Sample Competency Questions delivered by OP.</a:t>
+            </a:r>
+            <a:endParaRPr lang="en-GB" sz="1200" dirty="0"/>
           </a:p>
         </p:txBody>
       </p:sp>
@@ -5418,7 +5448,56 @@
         </p:nvSpPr>
         <p:spPr>
           <a:xfrm rot="5400000">
-            <a:off x="5532189" y="2326580"/>
+            <a:off x="5539504" y="2326580"/>
+            <a:ext cx="72000" cy="72000"/>
+          </a:xfrm>
+          <a:prstGeom prst="ellipse">
+            <a:avLst/>
+          </a:prstGeom>
+          <a:solidFill>
+            <a:schemeClr val="accent1">
+              <a:lumMod val="60000"/>
+              <a:lumOff val="40000"/>
+            </a:schemeClr>
+          </a:solidFill>
+          <a:ln>
+            <a:noFill/>
+          </a:ln>
+        </p:spPr>
+        <p:style>
+          <a:lnRef idx="2">
+            <a:schemeClr val="dk1">
+              <a:shade val="50000"/>
+            </a:schemeClr>
+          </a:lnRef>
+          <a:fillRef idx="1">
+            <a:schemeClr val="dk1"/>
+          </a:fillRef>
+          <a:effectRef idx="0">
+            <a:schemeClr val="dk1"/>
+          </a:effectRef>
+          <a:fontRef idx="minor">
+            <a:schemeClr val="lt1"/>
+          </a:fontRef>
+        </p:style>
+        <p:txBody>
+          <a:bodyPr rtlCol="0" anchor="ctr"/>
+          <a:lstStyle/>
+          <a:p>
+            <a:pPr algn="ctr"/>
+            <a:endParaRPr lang="en-GB"/>
+          </a:p>
+        </p:txBody>
+      </p:sp>
+      <p:sp>
+        <p:nvSpPr>
+          <p:cNvPr id="19" name="Elipse 18"/>
+          <p:cNvSpPr/>
+          <p:nvPr/>
+        </p:nvSpPr>
+        <p:spPr>
+          <a:xfrm rot="5400000">
+            <a:off x="5465131" y="2325364"/>
             <a:ext cx="72000" cy="72000"/>
           </a:xfrm>
           <a:prstGeom prst="ellipse">

</xml_diff>

<commit_message>
20180227Tu - Timeline intermediate milestones
</commit_message>
<xml_diff>
--- a/01_Resources/Timeline.pptx
+++ b/01_Resources/Timeline.pptx
@@ -4855,8 +4855,8 @@
         </p:nvSpPr>
         <p:spPr>
           <a:xfrm>
-            <a:off x="1471215" y="4934794"/>
-            <a:ext cx="3964547" cy="461665"/>
+            <a:off x="1037228" y="4934794"/>
+            <a:ext cx="4398534" cy="646331"/>
           </a:xfrm>
           <a:prstGeom prst="rect">
             <a:avLst/>
@@ -4864,7 +4864,7 @@
           <a:noFill/>
         </p:spPr>
         <p:txBody>
-          <a:bodyPr wrap="none" rtlCol="0">
+          <a:bodyPr wrap="square" rtlCol="0">
             <a:spAutoFit/>
           </a:bodyPr>
           <a:lstStyle/>
@@ -4915,7 +4915,7 @@
                   </a:schemeClr>
                 </a:solidFill>
               </a:rPr>
-              <a:t>Subject: Results of the </a:t>
+              <a:t>Subject: Revision of the ontology, OWL implementation and results of the </a:t>
             </a:r>
             <a:r>
               <a:rPr lang="en-GB" sz="1200" i="1" dirty="0" err="1" smtClean="0">
@@ -4937,7 +4937,7 @@
                   </a:schemeClr>
                 </a:solidFill>
               </a:rPr>
-              <a:t> and progress on the final version.</a:t>
+              <a:t>.</a:t>
             </a:r>
             <a:endParaRPr lang="en-GB" sz="1200" i="1" dirty="0">
               <a:solidFill>
@@ -5004,7 +5004,7 @@
         </p:nvSpPr>
         <p:spPr>
           <a:xfrm rot="5400000">
-            <a:off x="5482018" y="728163"/>
+            <a:off x="5480652" y="728163"/>
             <a:ext cx="115330" cy="115330"/>
           </a:xfrm>
           <a:prstGeom prst="ellipse">
@@ -5041,21 +5041,33 @@
       </p:sp>
       <p:sp>
         <p:nvSpPr>
-          <p:cNvPr id="24" name="Rectángulo redondeado 23"/>
+          <p:cNvPr id="45" name="Rectángulo redondeado 44"/>
           <p:cNvSpPr/>
           <p:nvPr/>
         </p:nvSpPr>
         <p:spPr>
           <a:xfrm rot="5400000">
-            <a:off x="3433682" y="3982204"/>
-            <a:ext cx="4212000" cy="144000"/>
+            <a:off x="5289990" y="2063002"/>
+            <a:ext cx="504000" cy="118800"/>
           </a:xfrm>
           <a:prstGeom prst="roundRect">
             <a:avLst/>
           </a:prstGeom>
-          <a:solidFill>
-            <a:srgbClr val="F8FECA"/>
-          </a:solidFill>
+          <a:gradFill flip="none" rotWithShape="1">
+            <a:gsLst>
+              <a:gs pos="61000">
+                <a:srgbClr val="E1EA99"/>
+              </a:gs>
+              <a:gs pos="0">
+                <a:srgbClr val="F8FECA"/>
+              </a:gs>
+              <a:gs pos="100000">
+                <a:srgbClr val="9AAE04"/>
+              </a:gs>
+            </a:gsLst>
+            <a:lin ang="10800000" scaled="1"/>
+            <a:tileRect/>
+          </a:gradFill>
           <a:ln>
             <a:noFill/>
           </a:ln>
@@ -5087,13 +5099,59 @@
       </p:sp>
       <p:sp>
         <p:nvSpPr>
+          <p:cNvPr id="24" name="Rectángulo redondeado 23"/>
+          <p:cNvSpPr/>
+          <p:nvPr/>
+        </p:nvSpPr>
+        <p:spPr>
+          <a:xfrm rot="5400000">
+            <a:off x="3651990" y="4175445"/>
+            <a:ext cx="3780000" cy="118800"/>
+          </a:xfrm>
+          <a:prstGeom prst="roundRect">
+            <a:avLst/>
+          </a:prstGeom>
+          <a:solidFill>
+            <a:srgbClr val="F8FECA"/>
+          </a:solidFill>
+          <a:ln>
+            <a:noFill/>
+          </a:ln>
+        </p:spPr>
+        <p:style>
+          <a:lnRef idx="2">
+            <a:schemeClr val="accent1">
+              <a:shade val="50000"/>
+            </a:schemeClr>
+          </a:lnRef>
+          <a:fillRef idx="1">
+            <a:schemeClr val="accent1"/>
+          </a:fillRef>
+          <a:effectRef idx="0">
+            <a:schemeClr val="accent1"/>
+          </a:effectRef>
+          <a:fontRef idx="minor">
+            <a:schemeClr val="lt1"/>
+          </a:fontRef>
+        </p:style>
+        <p:txBody>
+          <a:bodyPr rtlCol="0" anchor="ctr"/>
+          <a:lstStyle/>
+          <a:p>
+            <a:pPr algn="ctr"/>
+            <a:endParaRPr lang="en-GB"/>
+          </a:p>
+        </p:txBody>
+      </p:sp>
+      <p:sp>
+        <p:nvSpPr>
           <p:cNvPr id="25" name="Elipse 24"/>
           <p:cNvSpPr/>
           <p:nvPr/>
         </p:nvSpPr>
         <p:spPr>
           <a:xfrm rot="5400000">
-            <a:off x="5482018" y="1798137"/>
+            <a:off x="5480652" y="1798137"/>
             <a:ext cx="115330" cy="115330"/>
           </a:xfrm>
           <a:prstGeom prst="ellipse">
@@ -5136,7 +5194,7 @@
         </p:nvSpPr>
         <p:spPr>
           <a:xfrm rot="5400000">
-            <a:off x="5482819" y="6094514"/>
+            <a:off x="5480652" y="6094514"/>
             <a:ext cx="115330" cy="115330"/>
           </a:xfrm>
           <a:prstGeom prst="ellipse">
@@ -5185,7 +5243,7 @@
         </p:nvSpPr>
         <p:spPr>
           <a:xfrm rot="5400000">
-            <a:off x="5482017" y="2863762"/>
+            <a:off x="5480652" y="2863762"/>
             <a:ext cx="115330" cy="115330"/>
           </a:xfrm>
           <a:prstGeom prst="ellipse">
@@ -5234,7 +5292,7 @@
         </p:nvSpPr>
         <p:spPr>
           <a:xfrm rot="5400000">
-            <a:off x="5482017" y="3927959"/>
+            <a:off x="5480652" y="3927959"/>
             <a:ext cx="115330" cy="115330"/>
           </a:xfrm>
           <a:prstGeom prst="ellipse">
@@ -5283,7 +5341,7 @@
         </p:nvSpPr>
         <p:spPr>
           <a:xfrm rot="5400000">
-            <a:off x="5482819" y="5036649"/>
+            <a:off x="5480652" y="5036649"/>
             <a:ext cx="115330" cy="115330"/>
           </a:xfrm>
           <a:prstGeom prst="ellipse">
@@ -5373,8 +5431,8 @@
         </p:nvSpPr>
         <p:spPr>
           <a:xfrm>
-            <a:off x="5643602" y="2236827"/>
-            <a:ext cx="4398531" cy="646331"/>
+            <a:off x="5643602" y="2055852"/>
+            <a:ext cx="4398531" cy="600164"/>
           </a:xfrm>
           <a:prstGeom prst="rect">
             <a:avLst/>
@@ -5388,55 +5446,48 @@
           <a:lstStyle/>
           <a:p>
             <a:r>
-              <a:rPr lang="en-GB" sz="1200" dirty="0" smtClean="0"/>
+              <a:rPr lang="en-GB" sz="1100" dirty="0" smtClean="0"/>
               <a:t>9</a:t>
             </a:r>
             <a:r>
-              <a:rPr lang="en-GB" sz="1200" baseline="30000" dirty="0" smtClean="0"/>
+              <a:rPr lang="en-GB" sz="1100" baseline="30000" dirty="0" smtClean="0"/>
               <a:t>th</a:t>
             </a:r>
             <a:r>
-              <a:rPr lang="en-GB" sz="1200" dirty="0" smtClean="0"/>
+              <a:rPr lang="en-GB" sz="1100" dirty="0" smtClean="0"/>
               <a:t> March</a:t>
             </a:r>
-            <a:br>
-              <a:rPr lang="en-GB" sz="1200" dirty="0" smtClean="0"/>
-            </a:br>
-            <a:r>
-              <a:rPr lang="en-GB" sz="1200" dirty="0" smtClean="0"/>
+          </a:p>
+          <a:p>
+            <a:pPr lvl="1"/>
+            <a:r>
+              <a:rPr lang="en-GB" sz="1100" dirty="0" smtClean="0"/>
               <a:t>1. </a:t>
             </a:r>
             <a:r>
-              <a:rPr lang="en-GB" sz="1200" i="1" dirty="0" smtClean="0"/>
+              <a:rPr lang="en-GB" sz="1100" i="1" dirty="0" smtClean="0"/>
               <a:t>Glossary </a:t>
             </a:r>
             <a:r>
-              <a:rPr lang="en-GB" sz="1200" i="1" dirty="0"/>
+              <a:rPr lang="en-GB" sz="1100" i="1" dirty="0"/>
               <a:t>a</a:t>
             </a:r>
             <a:r>
-              <a:rPr lang="en-GB" sz="1200" i="1" dirty="0" smtClean="0"/>
-              <a:t>cceptance </a:t>
-            </a:r>
-            <a:r>
-              <a:rPr lang="en-GB" sz="1200" i="1" dirty="0" smtClean="0"/>
-              <a:t>by the Working Group</a:t>
-            </a:r>
-            <a:r>
-              <a:rPr lang="en-GB" sz="1200" i="1" dirty="0" smtClean="0"/>
-              <a:t>.</a:t>
-            </a:r>
-          </a:p>
-          <a:p>
-            <a:r>
-              <a:rPr lang="en-GB" sz="1200" dirty="0" smtClean="0"/>
+              <a:rPr lang="en-GB" sz="1100" i="1" dirty="0" smtClean="0"/>
+              <a:t>cceptance by the Working Group.</a:t>
+            </a:r>
+          </a:p>
+          <a:p>
+            <a:pPr lvl="1"/>
+            <a:r>
+              <a:rPr lang="en-GB" sz="1100" dirty="0" smtClean="0"/>
               <a:t>2. </a:t>
             </a:r>
             <a:r>
-              <a:rPr lang="en-GB" sz="1200" i="1" dirty="0" smtClean="0"/>
+              <a:rPr lang="en-GB" sz="1100" i="1" dirty="0" smtClean="0"/>
               <a:t>Sample Competency Questions delivered by OP.</a:t>
             </a:r>
-            <a:endParaRPr lang="en-GB" sz="1200" dirty="0"/>
+            <a:endParaRPr lang="en-GB" sz="1100" dirty="0"/>
           </a:p>
         </p:txBody>
       </p:sp>
@@ -5448,7 +5499,7 @@
         </p:nvSpPr>
         <p:spPr>
           <a:xfrm rot="5400000">
-            <a:off x="5539504" y="2326580"/>
+            <a:off x="5502317" y="2326580"/>
             <a:ext cx="72000" cy="72000"/>
           </a:xfrm>
           <a:prstGeom prst="ellipse">
@@ -5497,7 +5548,7 @@
         </p:nvSpPr>
         <p:spPr>
           <a:xfrm rot="5400000">
-            <a:off x="5465131" y="2325364"/>
+            <a:off x="5502317" y="2325364"/>
             <a:ext cx="72000" cy="72000"/>
           </a:xfrm>
           <a:prstGeom prst="ellipse">
@@ -5535,6 +5586,394 @@
           <a:p>
             <a:pPr algn="ctr"/>
             <a:endParaRPr lang="en-GB"/>
+          </a:p>
+        </p:txBody>
+      </p:sp>
+      <p:sp>
+        <p:nvSpPr>
+          <p:cNvPr id="37" name="Elipse 36"/>
+          <p:cNvSpPr/>
+          <p:nvPr/>
+        </p:nvSpPr>
+        <p:spPr>
+          <a:xfrm rot="5400000">
+            <a:off x="5502317" y="2698055"/>
+            <a:ext cx="72000" cy="72000"/>
+          </a:xfrm>
+          <a:prstGeom prst="ellipse">
+            <a:avLst/>
+          </a:prstGeom>
+          <a:solidFill>
+            <a:schemeClr val="accent1">
+              <a:lumMod val="60000"/>
+              <a:lumOff val="40000"/>
+            </a:schemeClr>
+          </a:solidFill>
+          <a:ln>
+            <a:noFill/>
+          </a:ln>
+        </p:spPr>
+        <p:style>
+          <a:lnRef idx="2">
+            <a:schemeClr val="dk1">
+              <a:shade val="50000"/>
+            </a:schemeClr>
+          </a:lnRef>
+          <a:fillRef idx="1">
+            <a:schemeClr val="dk1"/>
+          </a:fillRef>
+          <a:effectRef idx="0">
+            <a:schemeClr val="dk1"/>
+          </a:effectRef>
+          <a:fontRef idx="minor">
+            <a:schemeClr val="lt1"/>
+          </a:fontRef>
+        </p:style>
+        <p:txBody>
+          <a:bodyPr rtlCol="0" anchor="ctr"/>
+          <a:lstStyle/>
+          <a:p>
+            <a:pPr algn="ctr"/>
+            <a:endParaRPr lang="en-GB"/>
+          </a:p>
+        </p:txBody>
+      </p:sp>
+      <p:sp>
+        <p:nvSpPr>
+          <p:cNvPr id="38" name="CuadroTexto 37"/>
+          <p:cNvSpPr txBox="1"/>
+          <p:nvPr/>
+        </p:nvSpPr>
+        <p:spPr>
+          <a:xfrm>
+            <a:off x="5657936" y="2597746"/>
+            <a:ext cx="4398531" cy="261610"/>
+          </a:xfrm>
+          <a:prstGeom prst="rect">
+            <a:avLst/>
+          </a:prstGeom>
+          <a:noFill/>
+        </p:spPr>
+        <p:txBody>
+          <a:bodyPr wrap="square" rtlCol="0">
+            <a:spAutoFit/>
+          </a:bodyPr>
+          <a:lstStyle/>
+          <a:p>
+            <a:r>
+              <a:rPr lang="en-GB" sz="1100" dirty="0" smtClean="0"/>
+              <a:t>23</a:t>
+            </a:r>
+            <a:r>
+              <a:rPr lang="en-GB" sz="1100" baseline="30000" dirty="0" smtClean="0"/>
+              <a:t>rd </a:t>
+            </a:r>
+            <a:r>
+              <a:rPr lang="en-GB" sz="1100" dirty="0" smtClean="0"/>
+              <a:t>March: </a:t>
+            </a:r>
+            <a:r>
+              <a:rPr lang="en-GB" sz="1100" i="1" dirty="0" smtClean="0"/>
+              <a:t>Conceptual data model available</a:t>
+            </a:r>
+            <a:r>
+              <a:rPr lang="en-GB" sz="1100" i="1" dirty="0"/>
+              <a:t> </a:t>
+            </a:r>
+            <a:r>
+              <a:rPr lang="en-GB" sz="1100" i="1" dirty="0" smtClean="0"/>
+              <a:t>for revision by WG.</a:t>
+            </a:r>
+            <a:endParaRPr lang="en-GB" sz="1100" i="1" dirty="0"/>
+          </a:p>
+        </p:txBody>
+      </p:sp>
+      <p:sp>
+        <p:nvSpPr>
+          <p:cNvPr id="40" name="Elipse 39"/>
+          <p:cNvSpPr/>
+          <p:nvPr/>
+        </p:nvSpPr>
+        <p:spPr>
+          <a:xfrm rot="5400000">
+            <a:off x="5502317" y="3726755"/>
+            <a:ext cx="72000" cy="72000"/>
+          </a:xfrm>
+          <a:prstGeom prst="ellipse">
+            <a:avLst/>
+          </a:prstGeom>
+          <a:solidFill>
+            <a:schemeClr val="accent1">
+              <a:lumMod val="60000"/>
+              <a:lumOff val="40000"/>
+            </a:schemeClr>
+          </a:solidFill>
+          <a:ln>
+            <a:noFill/>
+          </a:ln>
+        </p:spPr>
+        <p:style>
+          <a:lnRef idx="2">
+            <a:schemeClr val="dk1">
+              <a:shade val="50000"/>
+            </a:schemeClr>
+          </a:lnRef>
+          <a:fillRef idx="1">
+            <a:schemeClr val="dk1"/>
+          </a:fillRef>
+          <a:effectRef idx="0">
+            <a:schemeClr val="dk1"/>
+          </a:effectRef>
+          <a:fontRef idx="minor">
+            <a:schemeClr val="lt1"/>
+          </a:fontRef>
+        </p:style>
+        <p:txBody>
+          <a:bodyPr rtlCol="0" anchor="ctr"/>
+          <a:lstStyle/>
+          <a:p>
+            <a:pPr algn="ctr"/>
+            <a:endParaRPr lang="en-GB"/>
+          </a:p>
+        </p:txBody>
+      </p:sp>
+      <p:sp>
+        <p:nvSpPr>
+          <p:cNvPr id="41" name="CuadroTexto 40"/>
+          <p:cNvSpPr txBox="1"/>
+          <p:nvPr/>
+        </p:nvSpPr>
+        <p:spPr>
+          <a:xfrm>
+            <a:off x="5657936" y="3626531"/>
+            <a:ext cx="3876589" cy="430887"/>
+          </a:xfrm>
+          <a:prstGeom prst="rect">
+            <a:avLst/>
+          </a:prstGeom>
+          <a:noFill/>
+        </p:spPr>
+        <p:txBody>
+          <a:bodyPr wrap="square" rtlCol="0">
+            <a:spAutoFit/>
+          </a:bodyPr>
+          <a:lstStyle/>
+          <a:p>
+            <a:r>
+              <a:rPr lang="en-GB" sz="1100" dirty="0" smtClean="0"/>
+              <a:t>19</a:t>
+            </a:r>
+            <a:r>
+              <a:rPr lang="en-GB" sz="1100" baseline="30000" dirty="0" smtClean="0"/>
+              <a:t>th</a:t>
+            </a:r>
+            <a:r>
+              <a:rPr lang="en-GB" sz="1100" dirty="0" smtClean="0"/>
+              <a:t> April: </a:t>
+            </a:r>
+            <a:r>
+              <a:rPr lang="en-GB" sz="1100" i="1" dirty="0" err="1" smtClean="0"/>
+              <a:t>PoC</a:t>
+            </a:r>
+            <a:r>
+              <a:rPr lang="en-GB" sz="1100" i="1" dirty="0" smtClean="0"/>
+              <a:t> and new version of the conceptual data model available</a:t>
+            </a:r>
+            <a:r>
+              <a:rPr lang="en-GB" sz="1100" i="1" dirty="0"/>
+              <a:t> </a:t>
+            </a:r>
+            <a:r>
+              <a:rPr lang="en-GB" sz="1100" i="1" dirty="0" smtClean="0"/>
+              <a:t>for revision by WG.</a:t>
+            </a:r>
+            <a:endParaRPr lang="en-GB" sz="1100" i="1" dirty="0"/>
+          </a:p>
+        </p:txBody>
+      </p:sp>
+      <p:sp>
+        <p:nvSpPr>
+          <p:cNvPr id="42" name="Elipse 41"/>
+          <p:cNvSpPr/>
+          <p:nvPr/>
+        </p:nvSpPr>
+        <p:spPr>
+          <a:xfrm rot="5400000">
+            <a:off x="5502317" y="4864355"/>
+            <a:ext cx="72000" cy="72000"/>
+          </a:xfrm>
+          <a:prstGeom prst="ellipse">
+            <a:avLst/>
+          </a:prstGeom>
+          <a:solidFill>
+            <a:schemeClr val="accent1">
+              <a:lumMod val="60000"/>
+              <a:lumOff val="40000"/>
+            </a:schemeClr>
+          </a:solidFill>
+          <a:ln>
+            <a:noFill/>
+          </a:ln>
+        </p:spPr>
+        <p:style>
+          <a:lnRef idx="2">
+            <a:schemeClr val="dk1">
+              <a:shade val="50000"/>
+            </a:schemeClr>
+          </a:lnRef>
+          <a:fillRef idx="1">
+            <a:schemeClr val="dk1"/>
+          </a:fillRef>
+          <a:effectRef idx="0">
+            <a:schemeClr val="dk1"/>
+          </a:effectRef>
+          <a:fontRef idx="minor">
+            <a:schemeClr val="lt1"/>
+          </a:fontRef>
+        </p:style>
+        <p:txBody>
+          <a:bodyPr rtlCol="0" anchor="ctr"/>
+          <a:lstStyle/>
+          <a:p>
+            <a:pPr algn="ctr"/>
+            <a:endParaRPr lang="en-GB"/>
+          </a:p>
+        </p:txBody>
+      </p:sp>
+      <p:sp>
+        <p:nvSpPr>
+          <p:cNvPr id="43" name="CuadroTexto 42"/>
+          <p:cNvSpPr txBox="1"/>
+          <p:nvPr/>
+        </p:nvSpPr>
+        <p:spPr>
+          <a:xfrm>
+            <a:off x="5660208" y="4764131"/>
+            <a:ext cx="3874317" cy="261610"/>
+          </a:xfrm>
+          <a:prstGeom prst="rect">
+            <a:avLst/>
+          </a:prstGeom>
+          <a:noFill/>
+        </p:spPr>
+        <p:txBody>
+          <a:bodyPr wrap="square" rtlCol="0">
+            <a:spAutoFit/>
+          </a:bodyPr>
+          <a:lstStyle/>
+          <a:p>
+            <a:r>
+              <a:rPr lang="en-GB" sz="1100" dirty="0" smtClean="0"/>
+              <a:t>26</a:t>
+            </a:r>
+            <a:r>
+              <a:rPr lang="en-GB" sz="1100" baseline="30000" dirty="0" smtClean="0"/>
+              <a:t>th</a:t>
+            </a:r>
+            <a:r>
+              <a:rPr lang="en-GB" sz="1100" dirty="0" smtClean="0"/>
+              <a:t> April: </a:t>
+            </a:r>
+            <a:r>
+              <a:rPr lang="en-GB" sz="1100" dirty="0" err="1" smtClean="0"/>
+              <a:t>PoC</a:t>
+            </a:r>
+            <a:r>
+              <a:rPr lang="en-GB" sz="1100" dirty="0" smtClean="0"/>
+              <a:t> Report available for revision by WG</a:t>
+            </a:r>
+            <a:r>
+              <a:rPr lang="en-GB" sz="1100" i="1" dirty="0" smtClean="0"/>
+              <a:t>.</a:t>
+            </a:r>
+            <a:endParaRPr lang="en-GB" sz="1100" i="1" dirty="0"/>
+          </a:p>
+        </p:txBody>
+      </p:sp>
+      <p:sp>
+        <p:nvSpPr>
+          <p:cNvPr id="39" name="Elipse 38"/>
+          <p:cNvSpPr/>
+          <p:nvPr/>
+        </p:nvSpPr>
+        <p:spPr>
+          <a:xfrm rot="5400000">
+            <a:off x="5502317" y="5892515"/>
+            <a:ext cx="72000" cy="72000"/>
+          </a:xfrm>
+          <a:prstGeom prst="ellipse">
+            <a:avLst/>
+          </a:prstGeom>
+          <a:solidFill>
+            <a:schemeClr val="accent1">
+              <a:lumMod val="60000"/>
+              <a:lumOff val="40000"/>
+            </a:schemeClr>
+          </a:solidFill>
+          <a:ln>
+            <a:noFill/>
+          </a:ln>
+        </p:spPr>
+        <p:style>
+          <a:lnRef idx="2">
+            <a:schemeClr val="dk1">
+              <a:shade val="50000"/>
+            </a:schemeClr>
+          </a:lnRef>
+          <a:fillRef idx="1">
+            <a:schemeClr val="dk1"/>
+          </a:fillRef>
+          <a:effectRef idx="0">
+            <a:schemeClr val="dk1"/>
+          </a:effectRef>
+          <a:fontRef idx="minor">
+            <a:schemeClr val="lt1"/>
+          </a:fontRef>
+        </p:style>
+        <p:txBody>
+          <a:bodyPr rtlCol="0" anchor="ctr"/>
+          <a:lstStyle/>
+          <a:p>
+            <a:pPr algn="ctr"/>
+            <a:endParaRPr lang="en-GB"/>
+          </a:p>
+        </p:txBody>
+      </p:sp>
+      <p:sp>
+        <p:nvSpPr>
+          <p:cNvPr id="44" name="CuadroTexto 43"/>
+          <p:cNvSpPr txBox="1"/>
+          <p:nvPr/>
+        </p:nvSpPr>
+        <p:spPr>
+          <a:xfrm>
+            <a:off x="5658060" y="5792291"/>
+            <a:ext cx="3874317" cy="261610"/>
+          </a:xfrm>
+          <a:prstGeom prst="rect">
+            <a:avLst/>
+          </a:prstGeom>
+          <a:noFill/>
+        </p:spPr>
+        <p:txBody>
+          <a:bodyPr wrap="square" rtlCol="0">
+            <a:spAutoFit/>
+          </a:bodyPr>
+          <a:lstStyle/>
+          <a:p>
+            <a:r>
+              <a:rPr lang="en-GB" sz="1100" dirty="0" smtClean="0"/>
+              <a:t>18</a:t>
+            </a:r>
+            <a:r>
+              <a:rPr lang="en-GB" sz="1100" baseline="30000" dirty="0" smtClean="0"/>
+              <a:t>th</a:t>
+            </a:r>
+            <a:r>
+              <a:rPr lang="en-GB" sz="1100" dirty="0" smtClean="0"/>
+              <a:t> June: Complete release v2.0.0 available for revision by WG.</a:t>
+            </a:r>
+            <a:endParaRPr lang="en-GB" sz="1100" i="1" dirty="0"/>
           </a:p>
         </p:txBody>
       </p:sp>

</xml_diff>

<commit_message>
20180302Fr - Timeline updated
</commit_message>
<xml_diff>
--- a/01_Resources/Timeline.pptx
+++ b/01_Resources/Timeline.pptx
@@ -256,7 +256,7 @@
           <a:p>
             <a:fld id="{DD47B1ED-05C6-43AD-85E9-3FF99C9F49B3}" type="datetimeFigureOut">
               <a:rPr lang="en-GB" smtClean="0"/>
-              <a:t>27/02/2018</a:t>
+              <a:t>02/03/2018</a:t>
             </a:fld>
             <a:endParaRPr lang="en-GB"/>
           </a:p>
@@ -426,7 +426,7 @@
           <a:p>
             <a:fld id="{DD47B1ED-05C6-43AD-85E9-3FF99C9F49B3}" type="datetimeFigureOut">
               <a:rPr lang="en-GB" smtClean="0"/>
-              <a:t>27/02/2018</a:t>
+              <a:t>02/03/2018</a:t>
             </a:fld>
             <a:endParaRPr lang="en-GB"/>
           </a:p>
@@ -606,7 +606,7 @@
           <a:p>
             <a:fld id="{DD47B1ED-05C6-43AD-85E9-3FF99C9F49B3}" type="datetimeFigureOut">
               <a:rPr lang="en-GB" smtClean="0"/>
-              <a:t>27/02/2018</a:t>
+              <a:t>02/03/2018</a:t>
             </a:fld>
             <a:endParaRPr lang="en-GB"/>
           </a:p>
@@ -776,7 +776,7 @@
           <a:p>
             <a:fld id="{DD47B1ED-05C6-43AD-85E9-3FF99C9F49B3}" type="datetimeFigureOut">
               <a:rPr lang="en-GB" smtClean="0"/>
-              <a:t>27/02/2018</a:t>
+              <a:t>02/03/2018</a:t>
             </a:fld>
             <a:endParaRPr lang="en-GB"/>
           </a:p>
@@ -1022,7 +1022,7 @@
           <a:p>
             <a:fld id="{DD47B1ED-05C6-43AD-85E9-3FF99C9F49B3}" type="datetimeFigureOut">
               <a:rPr lang="en-GB" smtClean="0"/>
-              <a:t>27/02/2018</a:t>
+              <a:t>02/03/2018</a:t>
             </a:fld>
             <a:endParaRPr lang="en-GB"/>
           </a:p>
@@ -1254,7 +1254,7 @@
           <a:p>
             <a:fld id="{DD47B1ED-05C6-43AD-85E9-3FF99C9F49B3}" type="datetimeFigureOut">
               <a:rPr lang="en-GB" smtClean="0"/>
-              <a:t>27/02/2018</a:t>
+              <a:t>02/03/2018</a:t>
             </a:fld>
             <a:endParaRPr lang="en-GB"/>
           </a:p>
@@ -1621,7 +1621,7 @@
           <a:p>
             <a:fld id="{DD47B1ED-05C6-43AD-85E9-3FF99C9F49B3}" type="datetimeFigureOut">
               <a:rPr lang="en-GB" smtClean="0"/>
-              <a:t>27/02/2018</a:t>
+              <a:t>02/03/2018</a:t>
             </a:fld>
             <a:endParaRPr lang="en-GB"/>
           </a:p>
@@ -1739,7 +1739,7 @@
           <a:p>
             <a:fld id="{DD47B1ED-05C6-43AD-85E9-3FF99C9F49B3}" type="datetimeFigureOut">
               <a:rPr lang="en-GB" smtClean="0"/>
-              <a:t>27/02/2018</a:t>
+              <a:t>02/03/2018</a:t>
             </a:fld>
             <a:endParaRPr lang="en-GB"/>
           </a:p>
@@ -1834,7 +1834,7 @@
           <a:p>
             <a:fld id="{DD47B1ED-05C6-43AD-85E9-3FF99C9F49B3}" type="datetimeFigureOut">
               <a:rPr lang="en-GB" smtClean="0"/>
-              <a:t>27/02/2018</a:t>
+              <a:t>02/03/2018</a:t>
             </a:fld>
             <a:endParaRPr lang="en-GB"/>
           </a:p>
@@ -2111,7 +2111,7 @@
           <a:p>
             <a:fld id="{DD47B1ED-05C6-43AD-85E9-3FF99C9F49B3}" type="datetimeFigureOut">
               <a:rPr lang="en-GB" smtClean="0"/>
-              <a:t>27/02/2018</a:t>
+              <a:t>02/03/2018</a:t>
             </a:fld>
             <a:endParaRPr lang="en-GB"/>
           </a:p>
@@ -2364,7 +2364,7 @@
           <a:p>
             <a:fld id="{DD47B1ED-05C6-43AD-85E9-3FF99C9F49B3}" type="datetimeFigureOut">
               <a:rPr lang="en-GB" smtClean="0"/>
-              <a:t>27/02/2018</a:t>
+              <a:t>02/03/2018</a:t>
             </a:fld>
             <a:endParaRPr lang="en-GB"/>
           </a:p>
@@ -2577,7 +2577,7 @@
           <a:p>
             <a:fld id="{DD47B1ED-05C6-43AD-85E9-3FF99C9F49B3}" type="datetimeFigureOut">
               <a:rPr lang="en-GB" smtClean="0"/>
-              <a:t>27/02/2018</a:t>
+              <a:t>02/03/2018</a:t>
             </a:fld>
             <a:endParaRPr lang="en-GB"/>
           </a:p>
@@ -5455,8 +5455,13 @@
             </a:r>
             <a:r>
               <a:rPr lang="en-GB" sz="1100" dirty="0" smtClean="0"/>
-              <a:t> March</a:t>
-            </a:r>
+              <a:t> </a:t>
+            </a:r>
+            <a:r>
+              <a:rPr lang="en-GB" sz="1100" dirty="0" smtClean="0"/>
+              <a:t>March:</a:t>
+            </a:r>
+            <a:endParaRPr lang="en-GB" sz="1100" dirty="0" smtClean="0"/>
           </a:p>
           <a:p>
             <a:pPr lvl="1"/>
@@ -5484,8 +5489,8 @@
               <a:t>2. </a:t>
             </a:r>
             <a:r>
-              <a:rPr lang="en-GB" sz="1100" i="1" dirty="0" smtClean="0"/>
-              <a:t>Sample Competency Questions delivered by OP.</a:t>
+              <a:rPr lang="en-GB" sz="1100" i="1" dirty="0"/>
+              <a:t>Sample Competency Questions available for the WG.</a:t>
             </a:r>
             <a:endParaRPr lang="en-GB" sz="1100" dirty="0"/>
           </a:p>
@@ -5646,8 +5651,8 @@
         </p:nvSpPr>
         <p:spPr>
           <a:xfrm>
-            <a:off x="5657936" y="2597746"/>
-            <a:ext cx="4398531" cy="261610"/>
+            <a:off x="5657936" y="2604570"/>
+            <a:ext cx="4398531" cy="600164"/>
           </a:xfrm>
           <a:prstGeom prst="rect">
             <a:avLst/>
@@ -5670,7 +5675,15 @@
             </a:r>
             <a:r>
               <a:rPr lang="en-GB" sz="1100" dirty="0" smtClean="0"/>
-              <a:t>March: </a:t>
+              <a:t>March:</a:t>
+            </a:r>
+            <a:endParaRPr lang="en-GB" sz="1100" dirty="0" smtClean="0"/>
+          </a:p>
+          <a:p>
+            <a:pPr lvl="1"/>
+            <a:r>
+              <a:rPr lang="en-GB" sz="1100" dirty="0" smtClean="0"/>
+              <a:t>1. </a:t>
             </a:r>
             <a:r>
               <a:rPr lang="en-GB" sz="1100" i="1" dirty="0" smtClean="0"/>
@@ -5684,7 +5697,17 @@
               <a:rPr lang="en-GB" sz="1100" i="1" dirty="0" smtClean="0"/>
               <a:t>for revision by WG.</a:t>
             </a:r>
-            <a:endParaRPr lang="en-GB" sz="1100" i="1" dirty="0"/>
+          </a:p>
+          <a:p>
+            <a:pPr lvl="1"/>
+            <a:r>
+              <a:rPr lang="en-GB" sz="1100" dirty="0"/>
+              <a:t>2. </a:t>
+            </a:r>
+            <a:r>
+              <a:rPr lang="en-GB" sz="1100" i="1" dirty="0"/>
+              <a:t>WG to provide competency questions</a:t>
+            </a:r>
           </a:p>
         </p:txBody>
       </p:sp>

</xml_diff>